<commit_message>
added drawer and palette dialog
</commit_message>
<xml_diff>
--- a/pomodoro/imgs/icons.pptx
+++ b/pomodoro/imgs/icons.pptx
@@ -3323,6 +3323,65 @@
       </p:grpSpPr>
       <p:sp>
         <p:nvSpPr>
+          <p:cNvPr id="24" name="矩形 23">
+            <a:extLst>
+              <a:ext uri="{FF2B5EF4-FFF2-40B4-BE49-F238E27FC236}">
+                <a16:creationId xmlns:a16="http://schemas.microsoft.com/office/drawing/2014/main" id="{2FD21C79-696F-4398-80EF-62F3D2F03A4D}"/>
+              </a:ext>
+            </a:extLst>
+          </p:cNvPr>
+          <p:cNvSpPr/>
+          <p:nvPr/>
+        </p:nvSpPr>
+        <p:spPr>
+          <a:xfrm>
+            <a:off x="1639382" y="664428"/>
+            <a:ext cx="1008000" cy="1008000"/>
+          </a:xfrm>
+          <a:prstGeom prst="rect">
+            <a:avLst/>
+          </a:prstGeom>
+          <a:solidFill>
+            <a:srgbClr val="404040"/>
+          </a:solidFill>
+          <a:ln>
+            <a:noFill/>
+          </a:ln>
+          <a:effectLst>
+            <a:outerShdw blurRad="63500" sx="102000" sy="102000" algn="ctr" rotWithShape="0">
+              <a:prstClr val="black">
+                <a:alpha val="40000"/>
+              </a:prstClr>
+            </a:outerShdw>
+          </a:effectLst>
+        </p:spPr>
+        <p:style>
+          <a:lnRef idx="2">
+            <a:schemeClr val="accent1">
+              <a:shade val="50000"/>
+            </a:schemeClr>
+          </a:lnRef>
+          <a:fillRef idx="1">
+            <a:schemeClr val="accent1"/>
+          </a:fillRef>
+          <a:effectRef idx="0">
+            <a:schemeClr val="accent1"/>
+          </a:effectRef>
+          <a:fontRef idx="minor">
+            <a:schemeClr val="lt1"/>
+          </a:fontRef>
+        </p:style>
+        <p:txBody>
+          <a:bodyPr rtlCol="0" anchor="ctr"/>
+          <a:lstStyle/>
+          <a:p>
+            <a:pPr algn="ctr"/>
+            <a:endParaRPr lang="zh-CN" altLang="en-US"/>
+          </a:p>
+        </p:txBody>
+      </p:sp>
+      <p:sp>
+        <p:nvSpPr>
           <p:cNvPr id="5" name="等腰三角形 4">
             <a:extLst>
               <a:ext uri="{FF2B5EF4-FFF2-40B4-BE49-F238E27FC236}">
@@ -3354,6 +3413,13 @@
               </a:schemeClr>
             </a:solidFill>
           </a:ln>
+          <a:effectLst>
+            <a:outerShdw blurRad="63500" sx="102000" sy="102000" algn="ctr" rotWithShape="0">
+              <a:prstClr val="black">
+                <a:alpha val="40000"/>
+              </a:prstClr>
+            </a:outerShdw>
+          </a:effectLst>
         </p:spPr>
         <p:style>
           <a:lnRef idx="0">
@@ -3405,9 +3471,11 @@
             </a:solidFill>
           </a:ln>
           <a:effectLst>
-            <a:innerShdw blurRad="114300">
-              <a:prstClr val="black"/>
-            </a:innerShdw>
+            <a:outerShdw blurRad="63500" sx="102000" sy="102000" algn="ctr" rotWithShape="0">
+              <a:prstClr val="black">
+                <a:alpha val="40000"/>
+              </a:prstClr>
+            </a:outerShdw>
           </a:effectLst>
         </p:spPr>
         <p:style>
@@ -3456,6 +3524,13 @@
             <a:chOff x="6726348" y="1016000"/>
             <a:chExt cx="418920" cy="885600"/>
           </a:xfrm>
+          <a:effectLst>
+            <a:outerShdw blurRad="63500" sx="102000" sy="102000" algn="ctr" rotWithShape="0">
+              <a:prstClr val="black">
+                <a:alpha val="40000"/>
+              </a:prstClr>
+            </a:outerShdw>
+          </a:effectLst>
         </p:grpSpPr>
         <p:cxnSp>
           <p:nvCxnSpPr>
@@ -3570,9 +3645,11 @@
             </a:solidFill>
           </a:ln>
           <a:effectLst>
-            <a:innerShdw blurRad="114300">
-              <a:prstClr val="black"/>
-            </a:innerShdw>
+            <a:outerShdw blurRad="63500" sx="102000" sy="102000" algn="ctr" rotWithShape="0">
+              <a:prstClr val="black">
+                <a:alpha val="40000"/>
+              </a:prstClr>
+            </a:outerShdw>
           </a:effectLst>
         </p:spPr>
         <p:style>
@@ -3689,9 +3766,11 @@
             </a:solidFill>
           </a:ln>
           <a:effectLst>
-            <a:innerShdw blurRad="114300">
-              <a:prstClr val="black"/>
-            </a:innerShdw>
+            <a:outerShdw blurRad="63500" sx="102000" sy="102000" algn="ctr" rotWithShape="0">
+              <a:prstClr val="black">
+                <a:alpha val="40000"/>
+              </a:prstClr>
+            </a:outerShdw>
           </a:effectLst>
         </p:spPr>
         <p:style>
@@ -3744,6 +3823,18 @@
           <a:solidFill>
             <a:srgbClr val="404040"/>
           </a:solidFill>
+          <a:ln>
+            <a:solidFill>
+              <a:srgbClr val="404040"/>
+            </a:solidFill>
+          </a:ln>
+          <a:effectLst>
+            <a:outerShdw blurRad="63500" sx="102000" sy="102000" algn="ctr" rotWithShape="0">
+              <a:prstClr val="black">
+                <a:alpha val="40000"/>
+              </a:prstClr>
+            </a:outerShdw>
+          </a:effectLst>
         </p:spPr>
         <p:style>
           <a:lnRef idx="2">
@@ -3770,6 +3861,129 @@
           </a:p>
         </p:txBody>
       </p:sp>
+      <p:cxnSp>
+        <p:nvCxnSpPr>
+          <p:cNvPr id="21" name="直接连接符 20">
+            <a:extLst>
+              <a:ext uri="{FF2B5EF4-FFF2-40B4-BE49-F238E27FC236}">
+                <a16:creationId xmlns:a16="http://schemas.microsoft.com/office/drawing/2014/main" id="{FADD4F15-7ED2-4B8E-8BF8-2AB4D0F5FE3B}"/>
+              </a:ext>
+            </a:extLst>
+          </p:cNvPr>
+          <p:cNvCxnSpPr/>
+          <p:nvPr/>
+        </p:nvCxnSpPr>
+        <p:spPr>
+          <a:xfrm rot="5400000">
+            <a:off x="2143382" y="509909"/>
+            <a:ext cx="0" cy="885600"/>
+          </a:xfrm>
+          <a:prstGeom prst="line">
+            <a:avLst/>
+          </a:prstGeom>
+          <a:ln w="76200">
+            <a:solidFill>
+              <a:srgbClr val="A5A5A5"/>
+            </a:solidFill>
+          </a:ln>
+        </p:spPr>
+        <p:style>
+          <a:lnRef idx="1">
+            <a:schemeClr val="accent1"/>
+          </a:lnRef>
+          <a:fillRef idx="0">
+            <a:schemeClr val="accent1"/>
+          </a:fillRef>
+          <a:effectRef idx="0">
+            <a:schemeClr val="accent1"/>
+          </a:effectRef>
+          <a:fontRef idx="minor">
+            <a:schemeClr val="tx1"/>
+          </a:fontRef>
+        </p:style>
+      </p:cxnSp>
+      <p:cxnSp>
+        <p:nvCxnSpPr>
+          <p:cNvPr id="22" name="直接连接符 21">
+            <a:extLst>
+              <a:ext uri="{FF2B5EF4-FFF2-40B4-BE49-F238E27FC236}">
+                <a16:creationId xmlns:a16="http://schemas.microsoft.com/office/drawing/2014/main" id="{661A788B-5007-47B7-B983-1B6FB12A7B97}"/>
+              </a:ext>
+            </a:extLst>
+          </p:cNvPr>
+          <p:cNvCxnSpPr/>
+          <p:nvPr/>
+        </p:nvCxnSpPr>
+        <p:spPr>
+          <a:xfrm rot="5400000">
+            <a:off x="2143382" y="725628"/>
+            <a:ext cx="0" cy="885600"/>
+          </a:xfrm>
+          <a:prstGeom prst="line">
+            <a:avLst/>
+          </a:prstGeom>
+          <a:ln w="76200">
+            <a:solidFill>
+              <a:srgbClr val="A5A5A5"/>
+            </a:solidFill>
+          </a:ln>
+        </p:spPr>
+        <p:style>
+          <a:lnRef idx="1">
+            <a:schemeClr val="accent1"/>
+          </a:lnRef>
+          <a:fillRef idx="0">
+            <a:schemeClr val="accent1"/>
+          </a:fillRef>
+          <a:effectRef idx="0">
+            <a:schemeClr val="accent1"/>
+          </a:effectRef>
+          <a:fontRef idx="minor">
+            <a:schemeClr val="tx1"/>
+          </a:fontRef>
+        </p:style>
+      </p:cxnSp>
+      <p:cxnSp>
+        <p:nvCxnSpPr>
+          <p:cNvPr id="23" name="直接连接符 22">
+            <a:extLst>
+              <a:ext uri="{FF2B5EF4-FFF2-40B4-BE49-F238E27FC236}">
+                <a16:creationId xmlns:a16="http://schemas.microsoft.com/office/drawing/2014/main" id="{490999D8-CB15-41B2-B8D7-6D88D7ED8A00}"/>
+              </a:ext>
+            </a:extLst>
+          </p:cNvPr>
+          <p:cNvCxnSpPr/>
+          <p:nvPr/>
+        </p:nvCxnSpPr>
+        <p:spPr>
+          <a:xfrm rot="5400000">
+            <a:off x="2143382" y="943200"/>
+            <a:ext cx="0" cy="885600"/>
+          </a:xfrm>
+          <a:prstGeom prst="line">
+            <a:avLst/>
+          </a:prstGeom>
+          <a:ln w="76200">
+            <a:solidFill>
+              <a:srgbClr val="A5A5A5"/>
+            </a:solidFill>
+          </a:ln>
+        </p:spPr>
+        <p:style>
+          <a:lnRef idx="1">
+            <a:schemeClr val="accent1"/>
+          </a:lnRef>
+          <a:fillRef idx="0">
+            <a:schemeClr val="accent1"/>
+          </a:fillRef>
+          <a:effectRef idx="0">
+            <a:schemeClr val="accent1"/>
+          </a:effectRef>
+          <a:fontRef idx="minor">
+            <a:schemeClr val="tx1"/>
+          </a:fontRef>
+        </p:style>
+      </p:cxnSp>
     </p:spTree>
     <p:extLst>
       <p:ext uri="{BB962C8B-B14F-4D97-AF65-F5344CB8AC3E}">

</xml_diff>